<commit_message>
Add: multiple test intanceand result
</commit_message>
<xml_diff>
--- a/OptimisationCourse_finalpresentation.pptx
+++ b/OptimisationCourse_finalpresentation.pptx
@@ -626,7 +626,7 @@
               <a:pPr>
                 <a:defRPr/>
               </a:pPr>
-              <a:t>11/11/2023</a:t>
+              <a:t>12/2/23</a:t>
             </a:fld>
             <a:endParaRPr lang="en-US"/>
           </a:p>
@@ -849,7 +849,7 @@
               <a:pPr>
                 <a:defRPr/>
               </a:pPr>
-              <a:t>11/11/2023</a:t>
+              <a:t>12/2/23</a:t>
             </a:fld>
             <a:endParaRPr lang="en-US"/>
           </a:p>
@@ -1260,6 +1260,144 @@
     <p:extLst>
       <p:ext uri="{BB962C8B-B14F-4D97-AF65-F5344CB8AC3E}">
         <p14:creationId xmlns:p14="http://schemas.microsoft.com/office/powerpoint/2010/main" val="1479980245"/>
+      </p:ext>
+    </p:extLst>
+  </p:cSld>
+  <p:clrMapOvr>
+    <a:masterClrMapping/>
+  </p:clrMapOvr>
+</p:notes>
+</file>
+
+<file path=ppt/notesSlides/notesSlide2.xml><?xml version="1.0" encoding="utf-8"?>
+<p:notes xmlns:a="http://schemas.openxmlformats.org/drawingml/2006/main" xmlns:r="http://schemas.openxmlformats.org/officeDocument/2006/relationships" xmlns:p="http://schemas.openxmlformats.org/presentationml/2006/main">
+  <p:cSld>
+    <p:spTree>
+      <p:nvGrpSpPr>
+        <p:cNvPr id="1" name=""/>
+        <p:cNvGrpSpPr/>
+        <p:nvPr/>
+      </p:nvGrpSpPr>
+      <p:grpSpPr>
+        <a:xfrm>
+          <a:off x="0" y="0"/>
+          <a:ext cx="0" cy="0"/>
+          <a:chOff x="0" y="0"/>
+          <a:chExt cx="0" cy="0"/>
+        </a:xfrm>
+      </p:grpSpPr>
+      <p:sp>
+        <p:nvSpPr>
+          <p:cNvPr id="2" name="Slide Image Placeholder 1"/>
+          <p:cNvSpPr>
+            <a:spLocks noGrp="1" noRot="1" noChangeAspect="1"/>
+          </p:cNvSpPr>
+          <p:nvPr>
+            <p:ph type="sldImg"/>
+          </p:nvPr>
+        </p:nvSpPr>
+        <p:spPr/>
+      </p:sp>
+      <p:sp>
+        <p:nvSpPr>
+          <p:cNvPr id="3" name="Notes Placeholder 2"/>
+          <p:cNvSpPr>
+            <a:spLocks noGrp="1"/>
+          </p:cNvSpPr>
+          <p:nvPr>
+            <p:ph type="body" idx="1"/>
+          </p:nvPr>
+        </p:nvSpPr>
+        <p:spPr/>
+        <p:txBody>
+          <a:bodyPr/>
+          <a:lstStyle/>
+          <a:p>
+            <a:r>
+              <a:rPr lang="en-US" dirty="0"/>
+              <a:t>C</a:t>
+            </a:r>
+            <a:r>
+              <a:rPr lang="en-LU" dirty="0"/>
+              <a:t>reate a instance folder</a:t>
+            </a:r>
+          </a:p>
+          <a:p>
+            <a:r>
+              <a:rPr lang="en-US" dirty="0"/>
+              <a:t>C</a:t>
+            </a:r>
+            <a:r>
+              <a:rPr lang="en-LU" dirty="0"/>
+              <a:t>reate a result folder</a:t>
+            </a:r>
+          </a:p>
+          <a:p>
+            <a:r>
+              <a:rPr lang="en-US" dirty="0"/>
+              <a:t>C</a:t>
+            </a:r>
+            <a:r>
+              <a:rPr lang="en-LU" dirty="0"/>
+              <a:t>hange exact_jump solver to gurobi</a:t>
+            </a:r>
+          </a:p>
+          <a:p>
+            <a:r>
+              <a:rPr lang="en-US" dirty="0"/>
+              <a:t>A</a:t>
+            </a:r>
+            <a:r>
+              <a:rPr lang="en-LU" dirty="0"/>
+              <a:t>dd a random seed number</a:t>
+            </a:r>
+          </a:p>
+          <a:p>
+            <a:r>
+              <a:rPr lang="en-US" dirty="0"/>
+              <a:t>C</a:t>
+            </a:r>
+            <a:r>
+              <a:rPr lang="en-LU"/>
+              <a:t>oluna test: give up 1000s (8133-5062)/8133</a:t>
+            </a:r>
+            <a:endParaRPr lang="en-LU" dirty="0"/>
+          </a:p>
+        </p:txBody>
+      </p:sp>
+      <p:sp>
+        <p:nvSpPr>
+          <p:cNvPr id="4" name="Slide Number Placeholder 3"/>
+          <p:cNvSpPr>
+            <a:spLocks noGrp="1"/>
+          </p:cNvSpPr>
+          <p:nvPr>
+            <p:ph type="sldNum" sz="quarter" idx="5"/>
+          </p:nvPr>
+        </p:nvSpPr>
+        <p:spPr/>
+        <p:txBody>
+          <a:bodyPr/>
+          <a:lstStyle/>
+          <a:p>
+            <a:pPr>
+              <a:defRPr/>
+            </a:pPr>
+            <a:fld id="{5DAD6506-EFD9-E946-BD8F-E104AD6F4F97}" type="slidenum">
+              <a:rPr lang="en-US" smtClean="0"/>
+              <a:pPr>
+                <a:defRPr/>
+              </a:pPr>
+              <a:t>7</a:t>
+            </a:fld>
+            <a:endParaRPr lang="en-US"/>
+          </a:p>
+        </p:txBody>
+      </p:sp>
+    </p:spTree>
+    <p:extLst>
+      <p:ext uri="{BB962C8B-B14F-4D97-AF65-F5344CB8AC3E}">
+        <p14:creationId xmlns:p14="http://schemas.microsoft.com/office/powerpoint/2010/main" val="2608053012"/>
       </p:ext>
     </p:extLst>
   </p:cSld>
@@ -11965,7 +12103,7 @@
             <p:nvPr userDrawn="1"/>
           </p:nvPicPr>
           <p:blipFill>
-            <a:blip r:embed="rId2" cstate="screen">
+            <a:blip r:embed="rId3" cstate="screen">
               <a:extLst>
                 <a:ext uri="{28A0092B-C50C-407E-A947-70E740481C1C}">
                   <a14:useLocalDpi xmlns:a14="http://schemas.microsoft.com/office/drawing/2010/main"/>
@@ -12191,8 +12329,32 @@
               <a:rPr lang="en-US" sz="1400" dirty="0">
                 <a:ea typeface="Times New Roman" panose="02020603050405020304" pitchFamily="18" charset="0"/>
               </a:rPr>
-              <a:t>Explanation of the column generation </a:t>
+              <a:t>Original formulation</a:t>
             </a:r>
+          </a:p>
+          <a:p>
+            <a:pPr defTabSz="914400"/>
+            <a:r>
+              <a:rPr lang="en-US" sz="1400" dirty="0">
+                <a:ea typeface="Times New Roman" panose="02020603050405020304" pitchFamily="18" charset="0"/>
+              </a:rPr>
+              <a:t>Master problem</a:t>
+            </a:r>
+          </a:p>
+          <a:p>
+            <a:pPr defTabSz="914400"/>
+            <a:r>
+              <a:rPr lang="en-US" sz="1400" dirty="0">
+                <a:ea typeface="Times New Roman" panose="02020603050405020304" pitchFamily="18" charset="0"/>
+              </a:rPr>
+              <a:t>Subproblem </a:t>
+            </a:r>
+          </a:p>
+          <a:p>
+            <a:pPr defTabSz="914400"/>
+            <a:endParaRPr lang="en-US" sz="1400" dirty="0">
+              <a:ea typeface="Times New Roman" panose="02020603050405020304" pitchFamily="18" charset="0"/>
+            </a:endParaRPr>
           </a:p>
         </p:txBody>
       </p:sp>
@@ -12211,10 +12373,10 @@
           <p:nvPr/>
         </p:nvPicPr>
         <p:blipFill>
-          <a:blip r:embed="rId3">
+          <a:blip r:embed="rId4">
             <a:extLst>
               <a:ext uri="{96DAC541-7B7A-43D3-8B79-37D633B846F1}">
-                <asvg:svgBlip xmlns:asvg="http://schemas.microsoft.com/office/drawing/2016/SVG/main" r:embed="rId4"/>
+                <asvg:svgBlip xmlns:asvg="http://schemas.microsoft.com/office/drawing/2016/SVG/main" r:embed="rId5"/>
               </a:ext>
             </a:extLst>
           </a:blip>
@@ -14930,6 +15092,44 @@
 </file>
 
 <file path=customXml/item1.xml><?xml version="1.0" encoding="utf-8"?>
+<?mso-contentType ?>
+<FormTemplates xmlns="http://schemas.microsoft.com/sharepoint/v3/contenttype/forms">
+  <Display>DocumentLibraryForm</Display>
+  <Edit>DocumentLibraryForm</Edit>
+  <New>DocumentLibraryForm</New>
+</FormTemplates>
+</file>
+
+<file path=customXml/item2.xml><?xml version="1.0" encoding="utf-8"?>
+<p:properties xmlns:p="http://schemas.microsoft.com/office/2006/metadata/properties" xmlns:xsi="http://www.w3.org/2001/XMLSchema-instance" xmlns:pc="http://schemas.microsoft.com/office/infopath/2007/PartnerControls">
+  <documentManagement>
+    <TaxCatchAll xmlns="a6c533f7-61db-40a9-92cc-7bf39d0de398">
+      <Value>14</Value>
+      <Value>74</Value>
+    </TaxCatchAll>
+    <o606121503634f60aadbd34f286ff3d9 xmlns="a6c533f7-61db-40a9-92cc-7bf39d0de398">
+      <Terms xmlns="http://schemas.microsoft.com/office/infopath/2007/PartnerControls">
+        <TermInfo xmlns="http://schemas.microsoft.com/office/infopath/2007/PartnerControls">
+          <TermName xmlns="http://schemas.microsoft.com/office/infopath/2007/PartnerControls">Template</TermName>
+          <TermId xmlns="http://schemas.microsoft.com/office/infopath/2007/PartnerControls">d449e3eb-181a-4ef3-83d2-948c1b505633</TermId>
+        </TermInfo>
+      </Terms>
+    </o606121503634f60aadbd34f286ff3d9>
+    <a60e8a9bb7a5498084be0308f3b51622 xmlns="a6c533f7-61db-40a9-92cc-7bf39d0de398">
+      <Terms xmlns="http://schemas.microsoft.com/office/infopath/2007/PartnerControls">
+        <TermInfo xmlns="http://schemas.microsoft.com/office/infopath/2007/PartnerControls">
+          <TermName xmlns="http://schemas.microsoft.com/office/infopath/2007/PartnerControls">CS</TermName>
+          <TermId xmlns="http://schemas.microsoft.com/office/infopath/2007/PartnerControls">fd244bff-d3ca-4376-a153-adc234d8de31</TermId>
+        </TermInfo>
+      </Terms>
+    </a60e8a9bb7a5498084be0308f3b51622>
+    <PublishingExpirationDate xmlns="http://schemas.microsoft.com/sharepoint/v3" xsi:nil="true"/>
+    <PublishingStartDate xmlns="http://schemas.microsoft.com/sharepoint/v3" xsi:nil="true"/>
+  </documentManagement>
+</p:properties>
+</file>
+
+<file path=customXml/item3.xml><?xml version="1.0" encoding="utf-8"?>
 <ct:contentTypeSchema xmlns:ct="http://schemas.microsoft.com/office/2006/metadata/contentType" xmlns:ma="http://schemas.microsoft.com/office/2006/metadata/properties/metaAttributes" ct:_="" ma:_="" ma:contentTypeName="Document" ma:contentTypeID="0x0101000D91315580376B46A11719EE4F871FF5" ma:contentTypeVersion="2" ma:contentTypeDescription="Create a new document." ma:contentTypeScope="" ma:versionID="8854321e5d77485fd489825fc93e6ca5">
   <xsd:schema xmlns:xsd="http://www.w3.org/2001/XMLSchema" xmlns:xs="http://www.w3.org/2001/XMLSchema" xmlns:p="http://schemas.microsoft.com/office/2006/metadata/properties" xmlns:ns1="http://schemas.microsoft.com/sharepoint/v3" xmlns:ns2="a6c533f7-61db-40a9-92cc-7bf39d0de398" targetNamespace="http://schemas.microsoft.com/office/2006/metadata/properties" ma:root="true" ma:fieldsID="d4c04313973a0c9248cfae03f8c66896" ns1:_="" ns2:_="">
     <xsd:import namespace="http://schemas.microsoft.com/sharepoint/v3"/>
@@ -15106,59 +15306,10 @@
 </ct:contentTypeSchema>
 </file>
 
-<file path=customXml/item2.xml><?xml version="1.0" encoding="utf-8"?>
-<p:properties xmlns:p="http://schemas.microsoft.com/office/2006/metadata/properties" xmlns:xsi="http://www.w3.org/2001/XMLSchema-instance" xmlns:pc="http://schemas.microsoft.com/office/infopath/2007/PartnerControls">
-  <documentManagement>
-    <TaxCatchAll xmlns="a6c533f7-61db-40a9-92cc-7bf39d0de398">
-      <Value>14</Value>
-      <Value>74</Value>
-    </TaxCatchAll>
-    <o606121503634f60aadbd34f286ff3d9 xmlns="a6c533f7-61db-40a9-92cc-7bf39d0de398">
-      <Terms xmlns="http://schemas.microsoft.com/office/infopath/2007/PartnerControls">
-        <TermInfo xmlns="http://schemas.microsoft.com/office/infopath/2007/PartnerControls">
-          <TermName xmlns="http://schemas.microsoft.com/office/infopath/2007/PartnerControls">Template</TermName>
-          <TermId xmlns="http://schemas.microsoft.com/office/infopath/2007/PartnerControls">d449e3eb-181a-4ef3-83d2-948c1b505633</TermId>
-        </TermInfo>
-      </Terms>
-    </o606121503634f60aadbd34f286ff3d9>
-    <a60e8a9bb7a5498084be0308f3b51622 xmlns="a6c533f7-61db-40a9-92cc-7bf39d0de398">
-      <Terms xmlns="http://schemas.microsoft.com/office/infopath/2007/PartnerControls">
-        <TermInfo xmlns="http://schemas.microsoft.com/office/infopath/2007/PartnerControls">
-          <TermName xmlns="http://schemas.microsoft.com/office/infopath/2007/PartnerControls">CS</TermName>
-          <TermId xmlns="http://schemas.microsoft.com/office/infopath/2007/PartnerControls">fd244bff-d3ca-4376-a153-adc234d8de31</TermId>
-        </TermInfo>
-      </Terms>
-    </a60e8a9bb7a5498084be0308f3b51622>
-    <PublishingExpirationDate xmlns="http://schemas.microsoft.com/sharepoint/v3" xsi:nil="true"/>
-    <PublishingStartDate xmlns="http://schemas.microsoft.com/sharepoint/v3" xsi:nil="true"/>
-  </documentManagement>
-</p:properties>
-</file>
-
-<file path=customXml/item3.xml><?xml version="1.0" encoding="utf-8"?>
-<?mso-contentType ?>
-<FormTemplates xmlns="http://schemas.microsoft.com/sharepoint/v3/contenttype/forms">
-  <Display>DocumentLibraryForm</Display>
-  <Edit>DocumentLibraryForm</Edit>
-  <New>DocumentLibraryForm</New>
-</FormTemplates>
-</file>
-
 <file path=customXml/itemProps1.xml><?xml version="1.0" encoding="utf-8"?>
-<ds:datastoreItem xmlns:ds="http://schemas.openxmlformats.org/officeDocument/2006/customXml" ds:itemID="{0660B9A4-C7B7-4FCB-887C-713BADDAC6BE}">
+<ds:datastoreItem xmlns:ds="http://schemas.openxmlformats.org/officeDocument/2006/customXml" ds:itemID="{40CEB917-FE66-4630-B98A-790134770770}">
   <ds:schemaRefs>
-    <ds:schemaRef ds:uri="http://schemas.microsoft.com/office/2006/metadata/contentType"/>
-    <ds:schemaRef ds:uri="http://schemas.microsoft.com/office/2006/metadata/properties/metaAttributes"/>
-    <ds:schemaRef ds:uri="http://www.w3.org/2001/XMLSchema"/>
-    <ds:schemaRef ds:uri="http://schemas.microsoft.com/office/2006/metadata/properties"/>
-    <ds:schemaRef ds:uri="http://schemas.microsoft.com/sharepoint/v3"/>
-    <ds:schemaRef ds:uri="a6c533f7-61db-40a9-92cc-7bf39d0de398"/>
-    <ds:schemaRef ds:uri="http://schemas.microsoft.com/office/2006/documentManagement/types"/>
-    <ds:schemaRef ds:uri="http://schemas.microsoft.com/office/infopath/2007/PartnerControls"/>
-    <ds:schemaRef ds:uri="http://schemas.openxmlformats.org/package/2006/metadata/core-properties"/>
-    <ds:schemaRef ds:uri="http://purl.org/dc/elements/1.1/"/>
-    <ds:schemaRef ds:uri="http://purl.org/dc/terms/"/>
-    <ds:schemaRef ds:uri="http://schemas.microsoft.com/internal/obd"/>
+    <ds:schemaRef ds:uri="http://schemas.microsoft.com/sharepoint/v3/contenttype/forms"/>
   </ds:schemaRefs>
 </ds:datastoreItem>
 </file>
@@ -15181,9 +15332,20 @@
 </file>
 
 <file path=customXml/itemProps3.xml><?xml version="1.0" encoding="utf-8"?>
-<ds:datastoreItem xmlns:ds="http://schemas.openxmlformats.org/officeDocument/2006/customXml" ds:itemID="{40CEB917-FE66-4630-B98A-790134770770}">
+<ds:datastoreItem xmlns:ds="http://schemas.openxmlformats.org/officeDocument/2006/customXml" ds:itemID="{0660B9A4-C7B7-4FCB-887C-713BADDAC6BE}">
   <ds:schemaRefs>
-    <ds:schemaRef ds:uri="http://schemas.microsoft.com/sharepoint/v3/contenttype/forms"/>
+    <ds:schemaRef ds:uri="http://schemas.microsoft.com/office/2006/metadata/contentType"/>
+    <ds:schemaRef ds:uri="http://schemas.microsoft.com/office/2006/metadata/properties/metaAttributes"/>
+    <ds:schemaRef ds:uri="http://www.w3.org/2001/XMLSchema"/>
+    <ds:schemaRef ds:uri="http://schemas.microsoft.com/office/2006/metadata/properties"/>
+    <ds:schemaRef ds:uri="http://schemas.microsoft.com/sharepoint/v3"/>
+    <ds:schemaRef ds:uri="a6c533f7-61db-40a9-92cc-7bf39d0de398"/>
+    <ds:schemaRef ds:uri="http://schemas.microsoft.com/office/2006/documentManagement/types"/>
+    <ds:schemaRef ds:uri="http://schemas.microsoft.com/office/infopath/2007/PartnerControls"/>
+    <ds:schemaRef ds:uri="http://schemas.openxmlformats.org/package/2006/metadata/core-properties"/>
+    <ds:schemaRef ds:uri="http://purl.org/dc/elements/1.1/"/>
+    <ds:schemaRef ds:uri="http://purl.org/dc/terms/"/>
+    <ds:schemaRef ds:uri="http://schemas.microsoft.com/internal/obd"/>
   </ds:schemaRefs>
 </ds:datastoreItem>
 </file>
</xml_diff>